<commit_message>
add Cheatcode Canopy Interception
</commit_message>
<xml_diff>
--- a/Canopy_Interception.pptx
+++ b/Canopy_Interception.pptx
@@ -7,20 +7,21 @@
   <p:sldIdLst>
     <p:sldId id="257" r:id="rId2"/>
     <p:sldId id="256" r:id="rId3"/>
-    <p:sldId id="258" r:id="rId4"/>
-    <p:sldId id="259" r:id="rId5"/>
-    <p:sldId id="260" r:id="rId6"/>
-    <p:sldId id="261" r:id="rId7"/>
-    <p:sldId id="262" r:id="rId8"/>
-    <p:sldId id="263" r:id="rId9"/>
-    <p:sldId id="264" r:id="rId10"/>
-    <p:sldId id="265" r:id="rId11"/>
-    <p:sldId id="266" r:id="rId12"/>
-    <p:sldId id="267" r:id="rId13"/>
-    <p:sldId id="268" r:id="rId14"/>
-    <p:sldId id="269" r:id="rId15"/>
-    <p:sldId id="270" r:id="rId16"/>
-    <p:sldId id="271" r:id="rId17"/>
+    <p:sldId id="272" r:id="rId4"/>
+    <p:sldId id="258" r:id="rId5"/>
+    <p:sldId id="259" r:id="rId6"/>
+    <p:sldId id="260" r:id="rId7"/>
+    <p:sldId id="261" r:id="rId8"/>
+    <p:sldId id="262" r:id="rId9"/>
+    <p:sldId id="263" r:id="rId10"/>
+    <p:sldId id="264" r:id="rId11"/>
+    <p:sldId id="265" r:id="rId12"/>
+    <p:sldId id="266" r:id="rId13"/>
+    <p:sldId id="267" r:id="rId14"/>
+    <p:sldId id="268" r:id="rId15"/>
+    <p:sldId id="269" r:id="rId16"/>
+    <p:sldId id="270" r:id="rId17"/>
+    <p:sldId id="271" r:id="rId18"/>
   </p:sldIdLst>
   <p:sldSz cx="12192000" cy="6858000"/>
   <p:notesSz cx="6858000" cy="9144000"/>
@@ -3544,6 +3545,401 @@
           <a:chExt cx="0" cy="0"/>
         </a:xfrm>
       </p:grpSpPr>
+      <p:pic>
+        <p:nvPicPr>
+          <p:cNvPr id="5" name="Picture 4" descr="Diagram&#10;&#10;Description automatically generated">
+            <a:extLst>
+              <a:ext uri="{FF2B5EF4-FFF2-40B4-BE49-F238E27FC236}">
+                <a16:creationId xmlns:a16="http://schemas.microsoft.com/office/drawing/2014/main" id="{AE882A21-E5EE-F8D0-0F83-949070BDE773}"/>
+              </a:ext>
+            </a:extLst>
+          </p:cNvPr>
+          <p:cNvPicPr>
+            <a:picLocks noChangeAspect="1"/>
+          </p:cNvPicPr>
+          <p:nvPr/>
+        </p:nvPicPr>
+        <p:blipFill>
+          <a:blip r:embed="rId2"/>
+          <a:stretch>
+            <a:fillRect/>
+          </a:stretch>
+        </p:blipFill>
+        <p:spPr>
+          <a:xfrm>
+            <a:off x="0" y="186055"/>
+            <a:ext cx="8402638" cy="6671945"/>
+          </a:xfrm>
+          <a:prstGeom prst="rect">
+            <a:avLst/>
+          </a:prstGeom>
+        </p:spPr>
+      </p:pic>
+      <mc:AlternateContent xmlns:mc="http://schemas.openxmlformats.org/markup-compatibility/2006">
+        <mc:Choice xmlns:a14="http://schemas.microsoft.com/office/drawing/2010/main" Requires="a14">
+          <p:sp>
+            <p:nvSpPr>
+              <p:cNvPr id="6" name="TextBox 5">
+                <a:extLst>
+                  <a:ext uri="{FF2B5EF4-FFF2-40B4-BE49-F238E27FC236}">
+                    <a16:creationId xmlns:a16="http://schemas.microsoft.com/office/drawing/2014/main" id="{82176202-26EB-393C-9BE4-BC907CE2748B}"/>
+                  </a:ext>
+                </a:extLst>
+              </p:cNvPr>
+              <p:cNvSpPr txBox="1"/>
+              <p:nvPr/>
+            </p:nvSpPr>
+            <p:spPr>
+              <a:xfrm>
+                <a:off x="7978775" y="2759586"/>
+                <a:ext cx="3914775" cy="669414"/>
+              </a:xfrm>
+              <a:prstGeom prst="rect">
+                <a:avLst/>
+              </a:prstGeom>
+              <a:noFill/>
+            </p:spPr>
+            <p:txBody>
+              <a:bodyPr wrap="square" rtlCol="0">
+                <a:spAutoFit/>
+              </a:bodyPr>
+              <a:lstStyle/>
+              <a:p>
+                <a14:m>
+                  <m:oMathPara xmlns:m="http://schemas.openxmlformats.org/officeDocument/2006/math">
+                    <m:oMathParaPr>
+                      <m:jc m:val="centerGroup"/>
+                    </m:oMathParaPr>
+                    <m:oMath xmlns:m="http://schemas.openxmlformats.org/officeDocument/2006/math">
+                      <m:r>
+                        <a:rPr lang="en-US" sz="3600" i="1" smtClean="0">
+                          <a:latin typeface="Cambria Math" panose="02040503050406030204" pitchFamily="18" charset="0"/>
+                          <a:ea typeface="Cambria Math" panose="02040503050406030204" pitchFamily="18" charset="0"/>
+                        </a:rPr>
+                        <m:t>𝜏</m:t>
+                      </m:r>
+                      <m:d>
+                        <m:dPr>
+                          <m:ctrlPr>
+                            <a:rPr lang="en-US" sz="3600" b="0" i="1" smtClean="0">
+                              <a:latin typeface="Cambria Math" panose="02040503050406030204" pitchFamily="18" charset="0"/>
+                              <a:ea typeface="Cambria Math" panose="02040503050406030204" pitchFamily="18" charset="0"/>
+                            </a:rPr>
+                          </m:ctrlPr>
+                        </m:dPr>
+                        <m:e>
+                          <m:r>
+                            <a:rPr lang="en-US" sz="3600" b="0" i="1" smtClean="0">
+                              <a:latin typeface="Cambria Math" panose="02040503050406030204" pitchFamily="18" charset="0"/>
+                              <a:ea typeface="Cambria Math" panose="02040503050406030204" pitchFamily="18" charset="0"/>
+                            </a:rPr>
+                            <m:t>𝜓</m:t>
+                          </m:r>
+                        </m:e>
+                      </m:d>
+                      <m:r>
+                        <a:rPr lang="en-US" sz="3600" b="0" i="1" smtClean="0">
+                          <a:latin typeface="Cambria Math" panose="02040503050406030204" pitchFamily="18" charset="0"/>
+                          <a:ea typeface="Cambria Math" panose="02040503050406030204" pitchFamily="18" charset="0"/>
+                        </a:rPr>
+                        <m:t>= </m:t>
+                      </m:r>
+                      <m:sSup>
+                        <m:sSupPr>
+                          <m:ctrlPr>
+                            <a:rPr lang="en-US" sz="3600" b="0" i="1" smtClean="0">
+                              <a:latin typeface="Cambria Math" panose="02040503050406030204" pitchFamily="18" charset="0"/>
+                              <a:ea typeface="Cambria Math" panose="02040503050406030204" pitchFamily="18" charset="0"/>
+                            </a:rPr>
+                          </m:ctrlPr>
+                        </m:sSupPr>
+                        <m:e>
+                          <m:r>
+                            <a:rPr lang="en-US" sz="3600" b="0" i="1" smtClean="0">
+                              <a:latin typeface="Cambria Math" panose="02040503050406030204" pitchFamily="18" charset="0"/>
+                              <a:ea typeface="Cambria Math" panose="02040503050406030204" pitchFamily="18" charset="0"/>
+                            </a:rPr>
+                            <m:t>𝑒</m:t>
+                          </m:r>
+                        </m:e>
+                        <m:sup>
+                          <m:r>
+                            <a:rPr lang="en-US" sz="3600" b="0" i="1" smtClean="0">
+                              <a:latin typeface="Cambria Math" panose="02040503050406030204" pitchFamily="18" charset="0"/>
+                              <a:ea typeface="Cambria Math" panose="02040503050406030204" pitchFamily="18" charset="0"/>
+                            </a:rPr>
+                            <m:t>−</m:t>
+                          </m:r>
+                          <m:r>
+                            <a:rPr lang="en-US" sz="3600" b="0" i="1" smtClean="0">
+                              <a:latin typeface="Cambria Math" panose="02040503050406030204" pitchFamily="18" charset="0"/>
+                              <a:ea typeface="Cambria Math" panose="02040503050406030204" pitchFamily="18" charset="0"/>
+                            </a:rPr>
+                            <m:t>𝑘</m:t>
+                          </m:r>
+                          <m:r>
+                            <a:rPr lang="en-US" sz="3600" b="0" i="1" smtClean="0">
+                              <a:latin typeface="Cambria Math" panose="02040503050406030204" pitchFamily="18" charset="0"/>
+                              <a:ea typeface="Cambria Math" panose="02040503050406030204" pitchFamily="18" charset="0"/>
+                            </a:rPr>
+                            <m:t>(</m:t>
+                          </m:r>
+                          <m:r>
+                            <a:rPr lang="en-US" sz="3600" b="0" i="1" smtClean="0">
+                              <a:latin typeface="Cambria Math" panose="02040503050406030204" pitchFamily="18" charset="0"/>
+                              <a:ea typeface="Cambria Math" panose="02040503050406030204" pitchFamily="18" charset="0"/>
+                            </a:rPr>
+                            <m:t>𝜓</m:t>
+                          </m:r>
+                          <m:r>
+                            <a:rPr lang="en-US" sz="3600" b="0" i="1" smtClean="0">
+                              <a:latin typeface="Cambria Math" panose="02040503050406030204" pitchFamily="18" charset="0"/>
+                              <a:ea typeface="Cambria Math" panose="02040503050406030204" pitchFamily="18" charset="0"/>
+                            </a:rPr>
+                            <m:t>)×</m:t>
+                          </m:r>
+                          <m:r>
+                            <a:rPr lang="en-US" sz="3600" b="0" i="1" smtClean="0">
+                              <a:latin typeface="Cambria Math" panose="02040503050406030204" pitchFamily="18" charset="0"/>
+                              <a:ea typeface="Cambria Math" panose="02040503050406030204" pitchFamily="18" charset="0"/>
+                            </a:rPr>
+                            <m:t>𝐿𝐴𝐼</m:t>
+                          </m:r>
+                        </m:sup>
+                      </m:sSup>
+                    </m:oMath>
+                  </m:oMathPara>
+                </a14:m>
+                <a:endParaRPr lang="en-US" sz="3600" dirty="0"/>
+              </a:p>
+            </p:txBody>
+          </p:sp>
+        </mc:Choice>
+        <mc:Fallback>
+          <p:sp>
+            <p:nvSpPr>
+              <p:cNvPr id="6" name="TextBox 5">
+                <a:extLst>
+                  <a:ext uri="{FF2B5EF4-FFF2-40B4-BE49-F238E27FC236}">
+                    <a16:creationId xmlns:a16="http://schemas.microsoft.com/office/drawing/2014/main" id="{82176202-26EB-393C-9BE4-BC907CE2748B}"/>
+                  </a:ext>
+                </a:extLst>
+              </p:cNvPr>
+              <p:cNvSpPr txBox="1">
+                <a:spLocks noRot="1" noChangeAspect="1" noMove="1" noResize="1" noEditPoints="1" noAdjustHandles="1" noChangeArrowheads="1" noChangeShapeType="1" noTextEdit="1"/>
+              </p:cNvSpPr>
+              <p:nvPr/>
+            </p:nvSpPr>
+            <p:spPr>
+              <a:xfrm>
+                <a:off x="7978775" y="2759586"/>
+                <a:ext cx="3914775" cy="669414"/>
+              </a:xfrm>
+              <a:prstGeom prst="rect">
+                <a:avLst/>
+              </a:prstGeom>
+              <a:blipFill>
+                <a:blip r:embed="rId3"/>
+                <a:stretch>
+                  <a:fillRect b="-24074"/>
+                </a:stretch>
+              </a:blipFill>
+            </p:spPr>
+            <p:txBody>
+              <a:bodyPr/>
+              <a:lstStyle/>
+              <a:p>
+                <a:r>
+                  <a:rPr lang="en-US">
+                    <a:noFill/>
+                  </a:rPr>
+                  <a:t> </a:t>
+                </a:r>
+              </a:p>
+            </p:txBody>
+          </p:sp>
+        </mc:Fallback>
+      </mc:AlternateContent>
+      <mc:AlternateContent xmlns:mc="http://schemas.openxmlformats.org/markup-compatibility/2006">
+        <mc:Choice xmlns:a14="http://schemas.microsoft.com/office/drawing/2010/main" Requires="a14">
+          <p:sp>
+            <p:nvSpPr>
+              <p:cNvPr id="7" name="TextBox 6">
+                <a:extLst>
+                  <a:ext uri="{FF2B5EF4-FFF2-40B4-BE49-F238E27FC236}">
+                    <a16:creationId xmlns:a16="http://schemas.microsoft.com/office/drawing/2014/main" id="{E55DB5B5-585C-CFDD-DBBC-5B94657E4DD9}"/>
+                  </a:ext>
+                </a:extLst>
+              </p:cNvPr>
+              <p:cNvSpPr txBox="1"/>
+              <p:nvPr/>
+            </p:nvSpPr>
+            <p:spPr>
+              <a:xfrm>
+                <a:off x="8104188" y="1057275"/>
+                <a:ext cx="3789362" cy="1384995"/>
+              </a:xfrm>
+              <a:prstGeom prst="rect">
+                <a:avLst/>
+              </a:prstGeom>
+              <a:noFill/>
+            </p:spPr>
+            <p:txBody>
+              <a:bodyPr wrap="square" rtlCol="0">
+                <a:spAutoFit/>
+              </a:bodyPr>
+              <a:lstStyle/>
+              <a:p>
+                <a:r>
+                  <a:rPr lang="en-US" sz="2800" dirty="0"/>
+                  <a:t>La </a:t>
+                </a:r>
+                <a:r>
+                  <a:rPr lang="en-US" sz="2800" dirty="0" err="1"/>
+                  <a:t>Transmisibilidad</a:t>
+                </a:r>
+                <a:r>
+                  <a:rPr lang="en-US" sz="2800" dirty="0"/>
+                  <a:t>, </a:t>
+                </a:r>
+                <a:r>
+                  <a:rPr lang="en-US" sz="2800" dirty="0" err="1"/>
+                  <a:t>cuanta</a:t>
+                </a:r>
+                <a:r>
+                  <a:rPr lang="en-US" sz="2800" dirty="0"/>
+                  <a:t> luz </a:t>
+                </a:r>
+                <a:r>
+                  <a:rPr lang="en-US" sz="2800" dirty="0" err="1"/>
+                  <a:t>pasa</a:t>
+                </a:r>
+                <a:r>
+                  <a:rPr lang="en-US" sz="2800" dirty="0"/>
+                  <a:t> </a:t>
+                </a:r>
+                <a:r>
+                  <a:rPr lang="en-US" sz="2800" dirty="0" err="1"/>
+                  <a:t>por</a:t>
+                </a:r>
+                <a:r>
+                  <a:rPr lang="en-US" sz="2800" dirty="0"/>
+                  <a:t> </a:t>
+                </a:r>
+                <a:r>
+                  <a:rPr lang="en-US" sz="2800" dirty="0" err="1"/>
+                  <a:t>nuesrto</a:t>
+                </a:r>
+                <a:r>
+                  <a:rPr lang="en-US" sz="2800" dirty="0"/>
+                  <a:t> </a:t>
+                </a:r>
+                <a:r>
+                  <a:rPr lang="en-US" sz="2800" dirty="0" err="1"/>
+                  <a:t>follaje</a:t>
+                </a:r>
+                <a:r>
+                  <a:rPr lang="en-US" sz="2800" dirty="0"/>
+                  <a:t>, </a:t>
+                </a:r>
+                <a14:m>
+                  <m:oMath xmlns:m="http://schemas.openxmlformats.org/officeDocument/2006/math">
+                    <m:r>
+                      <a:rPr lang="en-US" sz="2800" i="1" smtClean="0">
+                        <a:latin typeface="Cambria Math" panose="02040503050406030204" pitchFamily="18" charset="0"/>
+                        <a:ea typeface="Cambria Math" panose="02040503050406030204" pitchFamily="18" charset="0"/>
+                      </a:rPr>
+                      <m:t>𝜏</m:t>
+                    </m:r>
+                    <m:r>
+                      <a:rPr lang="en-US" sz="2800" b="0" i="1" smtClean="0">
+                        <a:latin typeface="Cambria Math" panose="02040503050406030204" pitchFamily="18" charset="0"/>
+                        <a:ea typeface="Cambria Math" panose="02040503050406030204" pitchFamily="18" charset="0"/>
+                      </a:rPr>
+                      <m:t>:</m:t>
+                    </m:r>
+                  </m:oMath>
+                </a14:m>
+                <a:endParaRPr lang="en-US" sz="2800" dirty="0"/>
+              </a:p>
+            </p:txBody>
+          </p:sp>
+        </mc:Choice>
+        <mc:Fallback>
+          <p:sp>
+            <p:nvSpPr>
+              <p:cNvPr id="7" name="TextBox 6">
+                <a:extLst>
+                  <a:ext uri="{FF2B5EF4-FFF2-40B4-BE49-F238E27FC236}">
+                    <a16:creationId xmlns:a16="http://schemas.microsoft.com/office/drawing/2014/main" id="{E55DB5B5-585C-CFDD-DBBC-5B94657E4DD9}"/>
+                  </a:ext>
+                </a:extLst>
+              </p:cNvPr>
+              <p:cNvSpPr txBox="1">
+                <a:spLocks noRot="1" noChangeAspect="1" noMove="1" noResize="1" noEditPoints="1" noAdjustHandles="1" noChangeArrowheads="1" noChangeShapeType="1" noTextEdit="1"/>
+              </p:cNvSpPr>
+              <p:nvPr/>
+            </p:nvSpPr>
+            <p:spPr>
+              <a:xfrm>
+                <a:off x="8104188" y="1057275"/>
+                <a:ext cx="3789362" cy="1384995"/>
+              </a:xfrm>
+              <a:prstGeom prst="rect">
+                <a:avLst/>
+              </a:prstGeom>
+              <a:blipFill>
+                <a:blip r:embed="rId4"/>
+                <a:stretch>
+                  <a:fillRect l="-3000" t="-4545" b="-10909"/>
+                </a:stretch>
+              </a:blipFill>
+            </p:spPr>
+            <p:txBody>
+              <a:bodyPr/>
+              <a:lstStyle/>
+              <a:p>
+                <a:r>
+                  <a:rPr lang="en-US">
+                    <a:noFill/>
+                  </a:rPr>
+                  <a:t> </a:t>
+                </a:r>
+              </a:p>
+            </p:txBody>
+          </p:sp>
+        </mc:Fallback>
+      </mc:AlternateContent>
+    </p:spTree>
+    <p:extLst>
+      <p:ext uri="{BB962C8B-B14F-4D97-AF65-F5344CB8AC3E}">
+        <p14:creationId xmlns:p14="http://schemas.microsoft.com/office/powerpoint/2010/main" val="3861651659"/>
+      </p:ext>
+    </p:extLst>
+  </p:cSld>
+  <p:clrMapOvr>
+    <a:masterClrMapping/>
+  </p:clrMapOvr>
+</p:sld>
+</file>
+
+<file path=ppt/slides/slide11.xml><?xml version="1.0" encoding="utf-8"?>
+<p:sld xmlns:a="http://schemas.openxmlformats.org/drawingml/2006/main" xmlns:r="http://schemas.openxmlformats.org/officeDocument/2006/relationships" xmlns:p="http://schemas.openxmlformats.org/presentationml/2006/main">
+  <p:cSld>
+    <p:spTree>
+      <p:nvGrpSpPr>
+        <p:cNvPr id="1" name=""/>
+        <p:cNvGrpSpPr/>
+        <p:nvPr/>
+      </p:nvGrpSpPr>
+      <p:grpSpPr>
+        <a:xfrm>
+          <a:off x="0" y="0"/>
+          <a:ext cx="0" cy="0"/>
+          <a:chOff x="0" y="0"/>
+          <a:chExt cx="0" cy="0"/>
+        </a:xfrm>
+      </p:grpSpPr>
       <p:sp>
         <p:nvSpPr>
           <p:cNvPr id="2" name="Title 1">
@@ -4111,7 +4507,7 @@
 </p:sld>
 </file>
 
-<file path=ppt/slides/slide11.xml><?xml version="1.0" encoding="utf-8"?>
+<file path=ppt/slides/slide12.xml><?xml version="1.0" encoding="utf-8"?>
 <p:sld xmlns:a="http://schemas.openxmlformats.org/drawingml/2006/main" xmlns:r="http://schemas.openxmlformats.org/officeDocument/2006/relationships" xmlns:p="http://schemas.openxmlformats.org/presentationml/2006/main">
   <p:cSld>
     <p:spTree>
@@ -4492,7 +4888,7 @@
                 </a:r>
                 <a:r>
                   <a:rPr lang="en-US" dirty="0"/>
-                  <a:t> x = </a:t>
+                  <a:t> x = +</a:t>
                 </a:r>
                 <a14:m>
                   <m:oMath xmlns:m="http://schemas.openxmlformats.org/officeDocument/2006/math">
@@ -4563,7 +4959,7 @@
 </p:sld>
 </file>
 
-<file path=ppt/slides/slide12.xml><?xml version="1.0" encoding="utf-8"?>
+<file path=ppt/slides/slide13.xml><?xml version="1.0" encoding="utf-8"?>
 <p:sld xmlns:a="http://schemas.openxmlformats.org/drawingml/2006/main" xmlns:r="http://schemas.openxmlformats.org/officeDocument/2006/relationships" xmlns:p="http://schemas.openxmlformats.org/presentationml/2006/main">
   <p:cSld>
     <p:spTree>
@@ -4640,7 +5036,7 @@
 </p:sld>
 </file>
 
-<file path=ppt/slides/slide13.xml><?xml version="1.0" encoding="utf-8"?>
+<file path=ppt/slides/slide14.xml><?xml version="1.0" encoding="utf-8"?>
 <p:sld xmlns:a="http://schemas.openxmlformats.org/drawingml/2006/main" xmlns:r="http://schemas.openxmlformats.org/officeDocument/2006/relationships" xmlns:p="http://schemas.openxmlformats.org/presentationml/2006/main">
   <p:cSld>
     <p:spTree>
@@ -4828,96 +5224,6 @@
     <p:extLst>
       <p:ext uri="{BB962C8B-B14F-4D97-AF65-F5344CB8AC3E}">
         <p14:creationId xmlns:p14="http://schemas.microsoft.com/office/powerpoint/2010/main" val="1160016707"/>
-      </p:ext>
-    </p:extLst>
-  </p:cSld>
-  <p:clrMapOvr>
-    <a:masterClrMapping/>
-  </p:clrMapOvr>
-</p:sld>
-</file>
-
-<file path=ppt/slides/slide14.xml><?xml version="1.0" encoding="utf-8"?>
-<p:sld xmlns:a="http://schemas.openxmlformats.org/drawingml/2006/main" xmlns:r="http://schemas.openxmlformats.org/officeDocument/2006/relationships" xmlns:p="http://schemas.openxmlformats.org/presentationml/2006/main">
-  <p:cSld>
-    <p:spTree>
-      <p:nvGrpSpPr>
-        <p:cNvPr id="1" name=""/>
-        <p:cNvGrpSpPr/>
-        <p:nvPr/>
-      </p:nvGrpSpPr>
-      <p:grpSpPr>
-        <a:xfrm>
-          <a:off x="0" y="0"/>
-          <a:ext cx="0" cy="0"/>
-          <a:chOff x="0" y="0"/>
-          <a:chExt cx="0" cy="0"/>
-        </a:xfrm>
-      </p:grpSpPr>
-      <p:pic>
-        <p:nvPicPr>
-          <p:cNvPr id="5" name="Picture 4" descr="Diagram&#10;&#10;Description automatically generated">
-            <a:extLst>
-              <a:ext uri="{FF2B5EF4-FFF2-40B4-BE49-F238E27FC236}">
-                <a16:creationId xmlns:a16="http://schemas.microsoft.com/office/drawing/2014/main" id="{A3EC8794-25D9-4CAF-248B-CF4C754F6F70}"/>
-              </a:ext>
-            </a:extLst>
-          </p:cNvPr>
-          <p:cNvPicPr>
-            <a:picLocks noChangeAspect="1"/>
-          </p:cNvPicPr>
-          <p:nvPr/>
-        </p:nvPicPr>
-        <p:blipFill>
-          <a:blip r:embed="rId2"/>
-          <a:stretch>
-            <a:fillRect/>
-          </a:stretch>
-        </p:blipFill>
-        <p:spPr>
-          <a:xfrm>
-            <a:off x="-528639" y="0"/>
-            <a:ext cx="8743421" cy="5901809"/>
-          </a:xfrm>
-          <a:prstGeom prst="rect">
-            <a:avLst/>
-          </a:prstGeom>
-        </p:spPr>
-      </p:pic>
-      <p:pic>
-        <p:nvPicPr>
-          <p:cNvPr id="8" name="Picture 7" descr="Table&#10;&#10;Description automatically generated">
-            <a:extLst>
-              <a:ext uri="{FF2B5EF4-FFF2-40B4-BE49-F238E27FC236}">
-                <a16:creationId xmlns:a16="http://schemas.microsoft.com/office/drawing/2014/main" id="{38BBEBBE-54ED-23F9-9324-9B1DC8584D16}"/>
-              </a:ext>
-            </a:extLst>
-          </p:cNvPr>
-          <p:cNvPicPr>
-            <a:picLocks noChangeAspect="1"/>
-          </p:cNvPicPr>
-          <p:nvPr/>
-        </p:nvPicPr>
-        <p:blipFill>
-          <a:blip r:embed="rId3"/>
-          <a:stretch>
-            <a:fillRect/>
-          </a:stretch>
-        </p:blipFill>
-        <p:spPr>
-          <a:xfrm>
-            <a:off x="6738936" y="956191"/>
-            <a:ext cx="6082189" cy="4505325"/>
-          </a:xfrm>
-          <a:prstGeom prst="rect">
-            <a:avLst/>
-          </a:prstGeom>
-        </p:spPr>
-      </p:pic>
-    </p:spTree>
-    <p:extLst>
-      <p:ext uri="{BB962C8B-B14F-4D97-AF65-F5344CB8AC3E}">
-        <p14:creationId xmlns:p14="http://schemas.microsoft.com/office/powerpoint/2010/main" val="3323538037"/>
       </p:ext>
     </p:extLst>
   </p:cSld>
@@ -4944,6 +5250,96 @@
           <a:chExt cx="0" cy="0"/>
         </a:xfrm>
       </p:grpSpPr>
+      <p:pic>
+        <p:nvPicPr>
+          <p:cNvPr id="5" name="Picture 4" descr="Diagram&#10;&#10;Description automatically generated">
+            <a:extLst>
+              <a:ext uri="{FF2B5EF4-FFF2-40B4-BE49-F238E27FC236}">
+                <a16:creationId xmlns:a16="http://schemas.microsoft.com/office/drawing/2014/main" id="{A3EC8794-25D9-4CAF-248B-CF4C754F6F70}"/>
+              </a:ext>
+            </a:extLst>
+          </p:cNvPr>
+          <p:cNvPicPr>
+            <a:picLocks noChangeAspect="1"/>
+          </p:cNvPicPr>
+          <p:nvPr/>
+        </p:nvPicPr>
+        <p:blipFill>
+          <a:blip r:embed="rId2"/>
+          <a:stretch>
+            <a:fillRect/>
+          </a:stretch>
+        </p:blipFill>
+        <p:spPr>
+          <a:xfrm>
+            <a:off x="-642939" y="0"/>
+            <a:ext cx="8743421" cy="5901809"/>
+          </a:xfrm>
+          <a:prstGeom prst="rect">
+            <a:avLst/>
+          </a:prstGeom>
+        </p:spPr>
+      </p:pic>
+      <p:pic>
+        <p:nvPicPr>
+          <p:cNvPr id="8" name="Picture 7" descr="Table&#10;&#10;Description automatically generated">
+            <a:extLst>
+              <a:ext uri="{FF2B5EF4-FFF2-40B4-BE49-F238E27FC236}">
+                <a16:creationId xmlns:a16="http://schemas.microsoft.com/office/drawing/2014/main" id="{38BBEBBE-54ED-23F9-9324-9B1DC8584D16}"/>
+              </a:ext>
+            </a:extLst>
+          </p:cNvPr>
+          <p:cNvPicPr>
+            <a:picLocks noChangeAspect="1"/>
+          </p:cNvPicPr>
+          <p:nvPr/>
+        </p:nvPicPr>
+        <p:blipFill>
+          <a:blip r:embed="rId3"/>
+          <a:stretch>
+            <a:fillRect/>
+          </a:stretch>
+        </p:blipFill>
+        <p:spPr>
+          <a:xfrm>
+            <a:off x="6781799" y="956191"/>
+            <a:ext cx="6082189" cy="4505325"/>
+          </a:xfrm>
+          <a:prstGeom prst="rect">
+            <a:avLst/>
+          </a:prstGeom>
+        </p:spPr>
+      </p:pic>
+    </p:spTree>
+    <p:extLst>
+      <p:ext uri="{BB962C8B-B14F-4D97-AF65-F5344CB8AC3E}">
+        <p14:creationId xmlns:p14="http://schemas.microsoft.com/office/powerpoint/2010/main" val="3323538037"/>
+      </p:ext>
+    </p:extLst>
+  </p:cSld>
+  <p:clrMapOvr>
+    <a:masterClrMapping/>
+  </p:clrMapOvr>
+</p:sld>
+</file>
+
+<file path=ppt/slides/slide16.xml><?xml version="1.0" encoding="utf-8"?>
+<p:sld xmlns:a="http://schemas.openxmlformats.org/drawingml/2006/main" xmlns:r="http://schemas.openxmlformats.org/officeDocument/2006/relationships" xmlns:p="http://schemas.openxmlformats.org/presentationml/2006/main">
+  <p:cSld>
+    <p:spTree>
+      <p:nvGrpSpPr>
+        <p:cNvPr id="1" name=""/>
+        <p:cNvGrpSpPr/>
+        <p:nvPr/>
+      </p:nvGrpSpPr>
+      <p:grpSpPr>
+        <a:xfrm>
+          <a:off x="0" y="0"/>
+          <a:ext cx="0" cy="0"/>
+          <a:chOff x="0" y="0"/>
+          <a:chExt cx="0" cy="0"/>
+        </a:xfrm>
+      </p:grpSpPr>
       <p:sp>
         <p:nvSpPr>
           <p:cNvPr id="2" name="Title 1">
@@ -5076,7 +5472,7 @@
                 </a:r>
                 <a:r>
                   <a:rPr lang="en-US" dirty="0"/>
-                  <a:t> 80% de la </a:t>
+                  <a:t> 60% de la </a:t>
                 </a:r>
                 <a:r>
                   <a:rPr lang="en-US" dirty="0" err="1"/>
@@ -5110,7 +5506,7 @@
                 </a14:m>
                 <a:r>
                   <a:rPr lang="en-US" dirty="0"/>
-                  <a:t> = 0.8</a:t>
+                  <a:t> = 0.6</a:t>
                 </a:r>
               </a:p>
               <a:p>
@@ -5359,7 +5755,7 @@
 </p:sld>
 </file>
 
-<file path=ppt/slides/slide16.xml><?xml version="1.0" encoding="utf-8"?>
+<file path=ppt/slides/slide17.xml><?xml version="1.0" encoding="utf-8"?>
 <p:sld xmlns:a="http://schemas.openxmlformats.org/drawingml/2006/main" xmlns:r="http://schemas.openxmlformats.org/officeDocument/2006/relationships" xmlns:p="http://schemas.openxmlformats.org/presentationml/2006/main">
   <p:cSld>
     <p:spTree>
@@ -5539,7 +5935,7 @@
         </p:nvSpPr>
         <p:spPr>
           <a:xfrm>
-            <a:off x="2340769" y="2719387"/>
+            <a:off x="2340769" y="2815976"/>
             <a:ext cx="2700338" cy="1728787"/>
           </a:xfrm>
           <a:prstGeom prst="rect">
@@ -5591,7 +5987,7 @@
             <p:spPr>
               <a:xfrm>
                 <a:off x="5321120" y="3457188"/>
-                <a:ext cx="579454" cy="276999"/>
+                <a:ext cx="1299330" cy="276999"/>
               </a:xfrm>
               <a:prstGeom prst="rect">
                 <a:avLst/>
@@ -5605,41 +6001,68 @@
               <a:lstStyle/>
               <a:p>
                 <a14:m>
-                  <m:oMathPara xmlns:m="http://schemas.openxmlformats.org/officeDocument/2006/math">
-                    <m:oMathParaPr>
-                      <m:jc m:val="centerGroup"/>
-                    </m:oMathParaPr>
-                    <m:oMath xmlns:m="http://schemas.openxmlformats.org/officeDocument/2006/math">
-                      <m:r>
-                        <a:rPr lang="en-US" b="0" i="1" smtClean="0">
-                          <a:latin typeface="Cambria Math" panose="02040503050406030204" pitchFamily="18" charset="0"/>
-                        </a:rPr>
-                        <m:t>𝐾</m:t>
-                      </m:r>
-                      <m:r>
-                        <a:rPr lang="en-US" b="0" i="1" smtClean="0">
-                          <a:latin typeface="Cambria Math" panose="02040503050406030204" pitchFamily="18" charset="0"/>
-                        </a:rPr>
-                        <m:t>(</m:t>
-                      </m:r>
-                      <m:r>
-                        <a:rPr lang="en-US" b="0" i="1" smtClean="0">
-                          <a:latin typeface="Cambria Math" panose="02040503050406030204" pitchFamily="18" charset="0"/>
-                          <a:ea typeface="Cambria Math" panose="02040503050406030204" pitchFamily="18" charset="0"/>
-                        </a:rPr>
-                        <m:t>𝜓</m:t>
-                      </m:r>
-                      <m:r>
-                        <a:rPr lang="en-US" b="0" i="1" smtClean="0">
-                          <a:latin typeface="Cambria Math" panose="02040503050406030204" pitchFamily="18" charset="0"/>
-                          <a:ea typeface="Cambria Math" panose="02040503050406030204" pitchFamily="18" charset="0"/>
-                        </a:rPr>
-                        <m:t>)</m:t>
-                      </m:r>
-                    </m:oMath>
-                  </m:oMathPara>
+                  <m:oMath xmlns:m="http://schemas.openxmlformats.org/officeDocument/2006/math">
+                    <m:r>
+                      <m:rPr>
+                        <m:sty m:val="p"/>
+                      </m:rPr>
+                      <a:rPr lang="el-GR" b="0" i="1" smtClean="0">
+                        <a:latin typeface="Cambria Math" panose="02040503050406030204" pitchFamily="18" charset="0"/>
+                        <a:ea typeface="Cambria Math" panose="02040503050406030204" pitchFamily="18" charset="0"/>
+                      </a:rPr>
+                      <m:t>Ω</m:t>
+                    </m:r>
+                    <m:r>
+                      <a:rPr lang="en-US" b="0" i="1" smtClean="0">
+                        <a:latin typeface="Cambria Math" panose="02040503050406030204" pitchFamily="18" charset="0"/>
+                        <a:ea typeface="Cambria Math" panose="02040503050406030204" pitchFamily="18" charset="0"/>
+                      </a:rPr>
+                      <m:t>;</m:t>
+                    </m:r>
+                    <m:r>
+                      <a:rPr lang="en-US" b="0" i="1" smtClean="0">
+                        <a:latin typeface="Cambria Math" panose="02040503050406030204" pitchFamily="18" charset="0"/>
+                      </a:rPr>
+                      <m:t>𝐾</m:t>
+                    </m:r>
+                    <m:d>
+                      <m:dPr>
+                        <m:ctrlPr>
+                          <a:rPr lang="en-US" b="0" i="1" smtClean="0">
+                            <a:latin typeface="Cambria Math" panose="02040503050406030204" pitchFamily="18" charset="0"/>
+                          </a:rPr>
+                        </m:ctrlPr>
+                      </m:dPr>
+                      <m:e>
+                        <m:r>
+                          <a:rPr lang="en-US" b="0" i="1" smtClean="0">
+                            <a:latin typeface="Cambria Math" panose="02040503050406030204" pitchFamily="18" charset="0"/>
+                            <a:ea typeface="Cambria Math" panose="02040503050406030204" pitchFamily="18" charset="0"/>
+                          </a:rPr>
+                          <m:t>𝜓</m:t>
+                        </m:r>
+                      </m:e>
+                    </m:d>
+                    <m:r>
+                      <a:rPr lang="en-US" b="0" i="1" smtClean="0">
+                        <a:latin typeface="Cambria Math" panose="02040503050406030204" pitchFamily="18" charset="0"/>
+                        <a:ea typeface="Cambria Math" panose="02040503050406030204" pitchFamily="18" charset="0"/>
+                      </a:rPr>
+                      <m:t>;</m:t>
+                    </m:r>
+                    <m:r>
+                      <a:rPr lang="en-US" b="0" i="1" smtClean="0">
+                        <a:latin typeface="Cambria Math" panose="02040503050406030204" pitchFamily="18" charset="0"/>
+                        <a:ea typeface="Cambria Math" panose="02040503050406030204" pitchFamily="18" charset="0"/>
+                      </a:rPr>
+                      <m:t>𝐿𝐴𝐼</m:t>
+                    </m:r>
+                  </m:oMath>
                 </a14:m>
-                <a:endParaRPr lang="en-US" dirty="0"/>
+                <a:r>
+                  <a:rPr lang="en-US" dirty="0"/>
+                  <a:t> </a:t>
+                </a:r>
               </a:p>
             </p:txBody>
           </p:sp>
@@ -5662,7 +6085,7 @@
             <p:spPr>
               <a:xfrm>
                 <a:off x="5321120" y="3457188"/>
-                <a:ext cx="579454" cy="276999"/>
+                <a:ext cx="1299330" cy="276999"/>
               </a:xfrm>
               <a:prstGeom prst="rect">
                 <a:avLst/>
@@ -5670,7 +6093,7 @@
               <a:blipFill>
                 <a:blip r:embed="rId2"/>
                 <a:stretch>
-                  <a:fillRect l="-8696" t="-4348" r="-13043" b="-30435"/>
+                  <a:fillRect l="-6796" b="-30435"/>
                 </a:stretch>
               </a:blipFill>
             </p:spPr>
@@ -6103,8 +6526,8 @@
             </p:nvSpPr>
             <p:spPr>
               <a:xfrm>
-                <a:off x="5741193" y="3742081"/>
-                <a:ext cx="7103259" cy="541110"/>
+                <a:off x="5755480" y="3858195"/>
+                <a:ext cx="7103259" cy="552267"/>
               </a:xfrm>
               <a:prstGeom prst="rect">
                 <a:avLst/>
@@ -6118,137 +6541,176 @@
               <a:lstStyle/>
               <a:p>
                 <a:pPr/>
-                <a:r>
-                  <a:rPr lang="en-US" sz="2800" dirty="0">
-                    <a:ea typeface="Cambria Math" panose="02040503050406030204" pitchFamily="18" charset="0"/>
-                  </a:rPr>
-                  <a:t>Canopy absorption</a:t>
-                </a:r>
                 <a14:m>
-                  <m:oMath xmlns:m="http://schemas.openxmlformats.org/officeDocument/2006/math">
-                    <m:r>
-                      <a:rPr lang="en-US" sz="2800" i="1">
-                        <a:latin typeface="Cambria Math" panose="02040503050406030204" pitchFamily="18" charset="0"/>
-                        <a:ea typeface="Cambria Math" panose="02040503050406030204" pitchFamily="18" charset="0"/>
-                      </a:rPr>
-                      <m:t>=</m:t>
-                    </m:r>
-                    <m:sSub>
-                      <m:sSubPr>
-                        <m:ctrlPr>
-                          <a:rPr lang="en-US" sz="2800" i="1" smtClean="0">
-                            <a:latin typeface="Cambria Math" panose="02040503050406030204" pitchFamily="18" charset="0"/>
-                            <a:ea typeface="Cambria Math" panose="02040503050406030204" pitchFamily="18" charset="0"/>
-                          </a:rPr>
-                        </m:ctrlPr>
-                      </m:sSubPr>
-                      <m:e>
-                        <m:r>
-                          <a:rPr lang="en-US" sz="2800" b="0" i="1" smtClean="0">
-                            <a:latin typeface="Cambria Math" panose="02040503050406030204" pitchFamily="18" charset="0"/>
-                            <a:ea typeface="Cambria Math" panose="02040503050406030204" pitchFamily="18" charset="0"/>
-                          </a:rPr>
-                          <m:t>𝐼</m:t>
-                        </m:r>
-                      </m:e>
-                      <m:sub>
-                        <m:r>
-                          <a:rPr lang="en-US" sz="2800" b="0" i="1" smtClean="0">
-                            <a:latin typeface="Cambria Math" panose="02040503050406030204" pitchFamily="18" charset="0"/>
-                            <a:ea typeface="Cambria Math" panose="02040503050406030204" pitchFamily="18" charset="0"/>
-                          </a:rPr>
-                          <m:t>0</m:t>
-                        </m:r>
-                      </m:sub>
-                    </m:sSub>
-                    <m:r>
-                      <a:rPr lang="en-US" sz="2800" i="1" smtClean="0">
-                        <a:latin typeface="Cambria Math" panose="02040503050406030204" pitchFamily="18" charset="0"/>
-                        <a:ea typeface="Cambria Math" panose="02040503050406030204" pitchFamily="18" charset="0"/>
-                      </a:rPr>
-                      <m:t>×</m:t>
-                    </m:r>
-                    <m:r>
-                      <a:rPr lang="en-US" sz="2800" b="0" i="1" smtClean="0">
-                        <a:latin typeface="Cambria Math" panose="02040503050406030204" pitchFamily="18" charset="0"/>
-                        <a:ea typeface="Cambria Math" panose="02040503050406030204" pitchFamily="18" charset="0"/>
-                      </a:rPr>
-                      <m:t>1−</m:t>
-                    </m:r>
-                    <m:sSup>
-                      <m:sSupPr>
-                        <m:ctrlPr>
-                          <a:rPr lang="en-US" sz="2800" i="1">
-                            <a:latin typeface="Cambria Math" panose="02040503050406030204" pitchFamily="18" charset="0"/>
-                            <a:ea typeface="Cambria Math" panose="02040503050406030204" pitchFamily="18" charset="0"/>
-                          </a:rPr>
-                        </m:ctrlPr>
-                      </m:sSupPr>
-                      <m:e>
-                        <m:r>
-                          <a:rPr lang="en-US" sz="2800" i="1">
-                            <a:latin typeface="Cambria Math" panose="02040503050406030204" pitchFamily="18" charset="0"/>
-                            <a:ea typeface="Cambria Math" panose="02040503050406030204" pitchFamily="18" charset="0"/>
-                          </a:rPr>
-                          <m:t>𝑒</m:t>
-                        </m:r>
-                      </m:e>
-                      <m:sup>
-                        <m:r>
-                          <a:rPr lang="en-US" sz="2800" i="1">
-                            <a:latin typeface="Cambria Math" panose="02040503050406030204" pitchFamily="18" charset="0"/>
-                            <a:ea typeface="Cambria Math" panose="02040503050406030204" pitchFamily="18" charset="0"/>
-                          </a:rPr>
-                          <m:t>−</m:t>
-                        </m:r>
-                        <m:r>
-                          <m:rPr>
-                            <m:sty m:val="p"/>
-                          </m:rPr>
-                          <a:rPr lang="el-GR" sz="2800" i="1" smtClean="0">
-                            <a:latin typeface="Cambria Math" panose="02040503050406030204" pitchFamily="18" charset="0"/>
-                            <a:ea typeface="Cambria Math" panose="02040503050406030204" pitchFamily="18" charset="0"/>
-                          </a:rPr>
-                          <m:t>Ω</m:t>
-                        </m:r>
-                        <m:r>
-                          <a:rPr lang="en-US" sz="2800" i="1">
-                            <a:latin typeface="Cambria Math" panose="02040503050406030204" pitchFamily="18" charset="0"/>
-                            <a:ea typeface="Cambria Math" panose="02040503050406030204" pitchFamily="18" charset="0"/>
-                          </a:rPr>
-                          <m:t>𝑘</m:t>
-                        </m:r>
-                        <m:r>
-                          <a:rPr lang="en-US" sz="2800" i="1">
-                            <a:latin typeface="Cambria Math" panose="02040503050406030204" pitchFamily="18" charset="0"/>
-                            <a:ea typeface="Cambria Math" panose="02040503050406030204" pitchFamily="18" charset="0"/>
-                          </a:rPr>
-                          <m:t>(</m:t>
-                        </m:r>
-                        <m:r>
-                          <a:rPr lang="en-US" sz="2800" i="1">
-                            <a:latin typeface="Cambria Math" panose="02040503050406030204" pitchFamily="18" charset="0"/>
-                            <a:ea typeface="Cambria Math" panose="02040503050406030204" pitchFamily="18" charset="0"/>
-                          </a:rPr>
-                          <m:t>𝜓</m:t>
-                        </m:r>
-                        <m:r>
-                          <a:rPr lang="en-US" sz="2800" i="1">
-                            <a:latin typeface="Cambria Math" panose="02040503050406030204" pitchFamily="18" charset="0"/>
-                            <a:ea typeface="Cambria Math" panose="02040503050406030204" pitchFamily="18" charset="0"/>
-                          </a:rPr>
-                          <m:t>)×</m:t>
-                        </m:r>
-                        <m:r>
-                          <a:rPr lang="en-US" sz="2800" i="1">
-                            <a:latin typeface="Cambria Math" panose="02040503050406030204" pitchFamily="18" charset="0"/>
-                            <a:ea typeface="Cambria Math" panose="02040503050406030204" pitchFamily="18" charset="0"/>
-                          </a:rPr>
-                          <m:t>𝐿𝐴𝐼</m:t>
-                        </m:r>
-                      </m:sup>
-                    </m:sSup>
-                  </m:oMath>
+                  <m:oMathPara xmlns:m="http://schemas.openxmlformats.org/officeDocument/2006/math">
+                    <m:oMathParaPr>
+                      <m:jc m:val="centerGroup"/>
+                    </m:oMathParaPr>
+                    <m:oMath xmlns:m="http://schemas.openxmlformats.org/officeDocument/2006/math">
+                      <m:sSub>
+                        <m:sSubPr>
+                          <m:ctrlPr>
+                            <a:rPr lang="en-US" sz="2800" b="0" i="1" smtClean="0">
+                              <a:latin typeface="Cambria Math" panose="02040503050406030204" pitchFamily="18" charset="0"/>
+                              <a:ea typeface="Cambria Math" panose="02040503050406030204" pitchFamily="18" charset="0"/>
+                            </a:rPr>
+                          </m:ctrlPr>
+                        </m:sSubPr>
+                        <m:e>
+                          <m:r>
+                            <a:rPr lang="en-US" sz="2800" b="0" i="1" smtClean="0">
+                              <a:latin typeface="Cambria Math" panose="02040503050406030204" pitchFamily="18" charset="0"/>
+                              <a:ea typeface="Cambria Math" panose="02040503050406030204" pitchFamily="18" charset="0"/>
+                            </a:rPr>
+                            <m:t>𝐼</m:t>
+                          </m:r>
+                        </m:e>
+                        <m:sub>
+                          <m:r>
+                            <a:rPr lang="en-US" sz="2800" b="0" i="1" smtClean="0">
+                              <a:latin typeface="Cambria Math" panose="02040503050406030204" pitchFamily="18" charset="0"/>
+                              <a:ea typeface="Cambria Math" panose="02040503050406030204" pitchFamily="18" charset="0"/>
+                            </a:rPr>
+                            <m:t>𝑎𝑏𝑠</m:t>
+                          </m:r>
+                        </m:sub>
+                      </m:sSub>
+                      <m:r>
+                        <a:rPr lang="en-US" sz="2800" b="0" i="1" smtClean="0">
+                          <a:latin typeface="Cambria Math" panose="02040503050406030204" pitchFamily="18" charset="0"/>
+                          <a:ea typeface="Cambria Math" panose="02040503050406030204" pitchFamily="18" charset="0"/>
+                        </a:rPr>
+                        <m:t>= </m:t>
+                      </m:r>
+                      <m:sSub>
+                        <m:sSubPr>
+                          <m:ctrlPr>
+                            <a:rPr lang="en-US" sz="2800" i="1" smtClean="0">
+                              <a:latin typeface="Cambria Math" panose="02040503050406030204" pitchFamily="18" charset="0"/>
+                              <a:ea typeface="Cambria Math" panose="02040503050406030204" pitchFamily="18" charset="0"/>
+                            </a:rPr>
+                          </m:ctrlPr>
+                        </m:sSubPr>
+                        <m:e>
+                          <m:r>
+                            <a:rPr lang="en-US" sz="2800" b="0" i="1" smtClean="0">
+                              <a:latin typeface="Cambria Math" panose="02040503050406030204" pitchFamily="18" charset="0"/>
+                              <a:ea typeface="Cambria Math" panose="02040503050406030204" pitchFamily="18" charset="0"/>
+                            </a:rPr>
+                            <m:t>𝐼</m:t>
+                          </m:r>
+                        </m:e>
+                        <m:sub>
+                          <m:r>
+                            <a:rPr lang="en-US" sz="2800" b="0" i="1" smtClean="0">
+                              <a:latin typeface="Cambria Math" panose="02040503050406030204" pitchFamily="18" charset="0"/>
+                              <a:ea typeface="Cambria Math" panose="02040503050406030204" pitchFamily="18" charset="0"/>
+                            </a:rPr>
+                            <m:t>0</m:t>
+                          </m:r>
+                        </m:sub>
+                      </m:sSub>
+                      <m:r>
+                        <a:rPr lang="en-US" sz="2800" i="1" smtClean="0">
+                          <a:latin typeface="Cambria Math" panose="02040503050406030204" pitchFamily="18" charset="0"/>
+                          <a:ea typeface="Cambria Math" panose="02040503050406030204" pitchFamily="18" charset="0"/>
+                        </a:rPr>
+                        <m:t>×</m:t>
+                      </m:r>
+                      <m:r>
+                        <a:rPr lang="en-US" sz="2800" b="0" i="1" smtClean="0">
+                          <a:latin typeface="Cambria Math" panose="02040503050406030204" pitchFamily="18" charset="0"/>
+                          <a:ea typeface="Cambria Math" panose="02040503050406030204" pitchFamily="18" charset="0"/>
+                        </a:rPr>
+                        <m:t>(1−</m:t>
+                      </m:r>
+                      <m:sSup>
+                        <m:sSupPr>
+                          <m:ctrlPr>
+                            <a:rPr lang="en-US" sz="2800" i="1">
+                              <a:latin typeface="Cambria Math" panose="02040503050406030204" pitchFamily="18" charset="0"/>
+                              <a:ea typeface="Cambria Math" panose="02040503050406030204" pitchFamily="18" charset="0"/>
+                            </a:rPr>
+                          </m:ctrlPr>
+                        </m:sSupPr>
+                        <m:e>
+                          <m:r>
+                            <a:rPr lang="en-US" sz="2800" i="1">
+                              <a:latin typeface="Cambria Math" panose="02040503050406030204" pitchFamily="18" charset="0"/>
+                              <a:ea typeface="Cambria Math" panose="02040503050406030204" pitchFamily="18" charset="0"/>
+                            </a:rPr>
+                            <m:t>𝑒</m:t>
+                          </m:r>
+                        </m:e>
+                        <m:sup>
+                          <m:r>
+                            <a:rPr lang="en-US" sz="2800" i="1">
+                              <a:latin typeface="Cambria Math" panose="02040503050406030204" pitchFamily="18" charset="0"/>
+                              <a:ea typeface="Cambria Math" panose="02040503050406030204" pitchFamily="18" charset="0"/>
+                            </a:rPr>
+                            <m:t>−</m:t>
+                          </m:r>
+                          <m:r>
+                            <m:rPr>
+                              <m:sty m:val="p"/>
+                            </m:rPr>
+                            <a:rPr lang="el-GR" sz="2800" i="0" smtClean="0">
+                              <a:latin typeface="Cambria Math" panose="02040503050406030204" pitchFamily="18" charset="0"/>
+                              <a:ea typeface="Cambria Math" panose="02040503050406030204" pitchFamily="18" charset="0"/>
+                            </a:rPr>
+                            <m:t>Ω</m:t>
+                          </m:r>
+                          <m:r>
+                            <a:rPr lang="en-US" sz="2800" i="1">
+                              <a:latin typeface="Cambria Math" panose="02040503050406030204" pitchFamily="18" charset="0"/>
+                              <a:ea typeface="Cambria Math" panose="02040503050406030204" pitchFamily="18" charset="0"/>
+                            </a:rPr>
+                            <m:t>𝑘</m:t>
+                          </m:r>
+                          <m:d>
+                            <m:dPr>
+                              <m:ctrlPr>
+                                <a:rPr lang="en-US" sz="2800" i="1">
+                                  <a:latin typeface="Cambria Math" panose="02040503050406030204" pitchFamily="18" charset="0"/>
+                                  <a:ea typeface="Cambria Math" panose="02040503050406030204" pitchFamily="18" charset="0"/>
+                                </a:rPr>
+                              </m:ctrlPr>
+                            </m:dPr>
+                            <m:e>
+                              <m:r>
+                                <a:rPr lang="en-US" sz="2800" i="1">
+                                  <a:latin typeface="Cambria Math" panose="02040503050406030204" pitchFamily="18" charset="0"/>
+                                  <a:ea typeface="Cambria Math" panose="02040503050406030204" pitchFamily="18" charset="0"/>
+                                </a:rPr>
+                                <m:t>𝜓</m:t>
+                              </m:r>
+                            </m:e>
+                          </m:d>
+                          <m:r>
+                            <a:rPr lang="en-US" sz="2800" i="1">
+                              <a:latin typeface="Cambria Math" panose="02040503050406030204" pitchFamily="18" charset="0"/>
+                              <a:ea typeface="Cambria Math" panose="02040503050406030204" pitchFamily="18" charset="0"/>
+                            </a:rPr>
+                            <m:t>×</m:t>
+                          </m:r>
+                          <m:r>
+                            <a:rPr lang="en-US" sz="2800" i="1">
+                              <a:latin typeface="Cambria Math" panose="02040503050406030204" pitchFamily="18" charset="0"/>
+                              <a:ea typeface="Cambria Math" panose="02040503050406030204" pitchFamily="18" charset="0"/>
+                            </a:rPr>
+                            <m:t>𝐿𝐴𝐼</m:t>
+                          </m:r>
+                        </m:sup>
+                      </m:sSup>
+                      <m:r>
+                        <a:rPr lang="en-US" sz="2800" b="0" i="1" smtClean="0">
+                          <a:latin typeface="Cambria Math" panose="02040503050406030204" pitchFamily="18" charset="0"/>
+                          <a:ea typeface="Cambria Math" panose="02040503050406030204" pitchFamily="18" charset="0"/>
+                        </a:rPr>
+                        <m:t>)</m:t>
+                      </m:r>
+                    </m:oMath>
+                  </m:oMathPara>
                 </a14:m>
                 <a:endParaRPr lang="en-US" sz="2800" dirty="0"/>
               </a:p>
@@ -6272,8 +6734,8 @@
             </p:nvSpPr>
             <p:spPr>
               <a:xfrm>
-                <a:off x="5741193" y="3742081"/>
-                <a:ext cx="7103259" cy="541110"/>
+                <a:off x="5755480" y="3858195"/>
+                <a:ext cx="7103259" cy="552267"/>
               </a:xfrm>
               <a:prstGeom prst="rect">
                 <a:avLst/>
@@ -6281,7 +6743,7 @@
               <a:blipFill>
                 <a:blip r:embed="rId5"/>
                 <a:stretch>
-                  <a:fillRect l="-1786" t="-6818" b="-29545"/>
+                  <a:fillRect b="-20000"/>
                 </a:stretch>
               </a:blipFill>
             </p:spPr>
@@ -6300,6 +6762,221 @@
           </p:sp>
         </mc:Fallback>
       </mc:AlternateContent>
+      <p:cxnSp>
+        <p:nvCxnSpPr>
+          <p:cNvPr id="23" name="Straight Connector 22">
+            <a:extLst>
+              <a:ext uri="{FF2B5EF4-FFF2-40B4-BE49-F238E27FC236}">
+                <a16:creationId xmlns:a16="http://schemas.microsoft.com/office/drawing/2014/main" id="{40D2FD89-105E-3B0C-B2CB-01D41D8A238F}"/>
+              </a:ext>
+            </a:extLst>
+          </p:cNvPr>
+          <p:cNvCxnSpPr/>
+          <p:nvPr/>
+        </p:nvCxnSpPr>
+        <p:spPr>
+          <a:xfrm>
+            <a:off x="2340769" y="3114675"/>
+            <a:ext cx="2700338" cy="0"/>
+          </a:xfrm>
+          <a:prstGeom prst="line">
+            <a:avLst/>
+          </a:prstGeom>
+          <a:ln w="31750">
+            <a:solidFill>
+              <a:schemeClr val="accent6">
+                <a:lumMod val="50000"/>
+              </a:schemeClr>
+            </a:solidFill>
+          </a:ln>
+        </p:spPr>
+        <p:style>
+          <a:lnRef idx="1">
+            <a:schemeClr val="accent1"/>
+          </a:lnRef>
+          <a:fillRef idx="0">
+            <a:schemeClr val="accent1"/>
+          </a:fillRef>
+          <a:effectRef idx="0">
+            <a:schemeClr val="accent1"/>
+          </a:effectRef>
+          <a:fontRef idx="minor">
+            <a:schemeClr val="tx1"/>
+          </a:fontRef>
+        </p:style>
+      </p:cxnSp>
+      <p:cxnSp>
+        <p:nvCxnSpPr>
+          <p:cNvPr id="24" name="Straight Connector 23">
+            <a:extLst>
+              <a:ext uri="{FF2B5EF4-FFF2-40B4-BE49-F238E27FC236}">
+                <a16:creationId xmlns:a16="http://schemas.microsoft.com/office/drawing/2014/main" id="{AB53A6F6-D5AA-E7CE-6311-0BCE65F10508}"/>
+              </a:ext>
+            </a:extLst>
+          </p:cNvPr>
+          <p:cNvCxnSpPr/>
+          <p:nvPr/>
+        </p:nvCxnSpPr>
+        <p:spPr>
+          <a:xfrm>
+            <a:off x="2340769" y="3429000"/>
+            <a:ext cx="2700338" cy="0"/>
+          </a:xfrm>
+          <a:prstGeom prst="line">
+            <a:avLst/>
+          </a:prstGeom>
+          <a:ln w="31750">
+            <a:solidFill>
+              <a:schemeClr val="accent6">
+                <a:lumMod val="50000"/>
+              </a:schemeClr>
+            </a:solidFill>
+          </a:ln>
+        </p:spPr>
+        <p:style>
+          <a:lnRef idx="1">
+            <a:schemeClr val="accent1"/>
+          </a:lnRef>
+          <a:fillRef idx="0">
+            <a:schemeClr val="accent1"/>
+          </a:fillRef>
+          <a:effectRef idx="0">
+            <a:schemeClr val="accent1"/>
+          </a:effectRef>
+          <a:fontRef idx="minor">
+            <a:schemeClr val="tx1"/>
+          </a:fontRef>
+        </p:style>
+      </p:cxnSp>
+      <p:cxnSp>
+        <p:nvCxnSpPr>
+          <p:cNvPr id="25" name="Straight Connector 24">
+            <a:extLst>
+              <a:ext uri="{FF2B5EF4-FFF2-40B4-BE49-F238E27FC236}">
+                <a16:creationId xmlns:a16="http://schemas.microsoft.com/office/drawing/2014/main" id="{DFB70D32-5FB1-C91B-1FDF-4ABAA2BD6CAD}"/>
+              </a:ext>
+            </a:extLst>
+          </p:cNvPr>
+          <p:cNvCxnSpPr/>
+          <p:nvPr/>
+        </p:nvCxnSpPr>
+        <p:spPr>
+          <a:xfrm>
+            <a:off x="2340769" y="4040122"/>
+            <a:ext cx="2700338" cy="0"/>
+          </a:xfrm>
+          <a:prstGeom prst="line">
+            <a:avLst/>
+          </a:prstGeom>
+          <a:ln w="31750">
+            <a:solidFill>
+              <a:schemeClr val="accent6">
+                <a:lumMod val="50000"/>
+              </a:schemeClr>
+            </a:solidFill>
+          </a:ln>
+        </p:spPr>
+        <p:style>
+          <a:lnRef idx="1">
+            <a:schemeClr val="accent1"/>
+          </a:lnRef>
+          <a:fillRef idx="0">
+            <a:schemeClr val="accent1"/>
+          </a:fillRef>
+          <a:effectRef idx="0">
+            <a:schemeClr val="accent1"/>
+          </a:effectRef>
+          <a:fontRef idx="minor">
+            <a:schemeClr val="tx1"/>
+          </a:fontRef>
+        </p:style>
+      </p:cxnSp>
+      <p:cxnSp>
+        <p:nvCxnSpPr>
+          <p:cNvPr id="26" name="Straight Connector 25">
+            <a:extLst>
+              <a:ext uri="{FF2B5EF4-FFF2-40B4-BE49-F238E27FC236}">
+                <a16:creationId xmlns:a16="http://schemas.microsoft.com/office/drawing/2014/main" id="{65EA6ACD-61E3-3734-F5A3-E060A1E588FB}"/>
+              </a:ext>
+            </a:extLst>
+          </p:cNvPr>
+          <p:cNvCxnSpPr/>
+          <p:nvPr/>
+        </p:nvCxnSpPr>
+        <p:spPr>
+          <a:xfrm>
+            <a:off x="2340769" y="3734187"/>
+            <a:ext cx="2700338" cy="0"/>
+          </a:xfrm>
+          <a:prstGeom prst="line">
+            <a:avLst/>
+          </a:prstGeom>
+          <a:ln w="31750">
+            <a:solidFill>
+              <a:schemeClr val="accent6">
+                <a:lumMod val="50000"/>
+              </a:schemeClr>
+            </a:solidFill>
+          </a:ln>
+        </p:spPr>
+        <p:style>
+          <a:lnRef idx="1">
+            <a:schemeClr val="accent1"/>
+          </a:lnRef>
+          <a:fillRef idx="0">
+            <a:schemeClr val="accent1"/>
+          </a:fillRef>
+          <a:effectRef idx="0">
+            <a:schemeClr val="accent1"/>
+          </a:effectRef>
+          <a:fontRef idx="minor">
+            <a:schemeClr val="tx1"/>
+          </a:fontRef>
+        </p:style>
+      </p:cxnSp>
+      <p:cxnSp>
+        <p:nvCxnSpPr>
+          <p:cNvPr id="27" name="Straight Connector 26">
+            <a:extLst>
+              <a:ext uri="{FF2B5EF4-FFF2-40B4-BE49-F238E27FC236}">
+                <a16:creationId xmlns:a16="http://schemas.microsoft.com/office/drawing/2014/main" id="{14047A06-0127-CA52-2E9A-9B50F2FFC47E}"/>
+              </a:ext>
+            </a:extLst>
+          </p:cNvPr>
+          <p:cNvCxnSpPr/>
+          <p:nvPr/>
+        </p:nvCxnSpPr>
+        <p:spPr>
+          <a:xfrm>
+            <a:off x="2340769" y="4340070"/>
+            <a:ext cx="2700338" cy="0"/>
+          </a:xfrm>
+          <a:prstGeom prst="line">
+            <a:avLst/>
+          </a:prstGeom>
+          <a:ln w="31750">
+            <a:solidFill>
+              <a:schemeClr val="accent6">
+                <a:lumMod val="50000"/>
+              </a:schemeClr>
+            </a:solidFill>
+          </a:ln>
+        </p:spPr>
+        <p:style>
+          <a:lnRef idx="1">
+            <a:schemeClr val="accent1"/>
+          </a:lnRef>
+          <a:fillRef idx="0">
+            <a:schemeClr val="accent1"/>
+          </a:fillRef>
+          <a:effectRef idx="0">
+            <a:schemeClr val="accent1"/>
+          </a:effectRef>
+          <a:fontRef idx="minor">
+            <a:schemeClr val="tx1"/>
+          </a:fontRef>
+        </p:style>
+      </p:cxnSp>
     </p:spTree>
     <p:extLst>
       <p:ext uri="{BB962C8B-B14F-4D97-AF65-F5344CB8AC3E}">
@@ -6468,6 +7145,83 @@
 </file>
 
 <file path=ppt/slides/slide3.xml><?xml version="1.0" encoding="utf-8"?>
+<p:sld xmlns:a="http://schemas.openxmlformats.org/drawingml/2006/main" xmlns:r="http://schemas.openxmlformats.org/officeDocument/2006/relationships" xmlns:p="http://schemas.openxmlformats.org/presentationml/2006/main">
+  <p:cSld>
+    <p:spTree>
+      <p:nvGrpSpPr>
+        <p:cNvPr id="1" name=""/>
+        <p:cNvGrpSpPr/>
+        <p:nvPr/>
+      </p:nvGrpSpPr>
+      <p:grpSpPr>
+        <a:xfrm>
+          <a:off x="0" y="0"/>
+          <a:ext cx="0" cy="0"/>
+          <a:chOff x="0" y="0"/>
+          <a:chExt cx="0" cy="0"/>
+        </a:xfrm>
+      </p:grpSpPr>
+      <p:pic>
+        <p:nvPicPr>
+          <p:cNvPr id="4" name="Picture 2" descr="Surface Energy | Atmospheric Turbulence &amp; Diffusion Division">
+            <a:extLst>
+              <a:ext uri="{FF2B5EF4-FFF2-40B4-BE49-F238E27FC236}">
+                <a16:creationId xmlns:a16="http://schemas.microsoft.com/office/drawing/2014/main" id="{28FFCDC0-BE2A-56A6-41EB-3D408F52B563}"/>
+              </a:ext>
+            </a:extLst>
+          </p:cNvPr>
+          <p:cNvPicPr>
+            <a:picLocks noChangeAspect="1" noChangeArrowheads="1"/>
+          </p:cNvPicPr>
+          <p:nvPr/>
+        </p:nvPicPr>
+        <p:blipFill>
+          <a:blip r:embed="rId2">
+            <a:extLst>
+              <a:ext uri="{28A0092B-C50C-407E-A947-70E740481C1C}">
+                <a14:useLocalDpi xmlns:a14="http://schemas.microsoft.com/office/drawing/2010/main" val="0"/>
+              </a:ext>
+            </a:extLst>
+          </a:blip>
+          <a:srcRect/>
+          <a:stretch>
+            <a:fillRect/>
+          </a:stretch>
+        </p:blipFill>
+        <p:spPr bwMode="auto">
+          <a:xfrm>
+            <a:off x="1395413" y="452658"/>
+            <a:ext cx="9401173" cy="6219605"/>
+          </a:xfrm>
+          <a:prstGeom prst="rect">
+            <a:avLst/>
+          </a:prstGeom>
+          <a:noFill/>
+          <a:extLst>
+            <a:ext uri="{909E8E84-426E-40DD-AFC4-6F175D3DCCD1}">
+              <a14:hiddenFill xmlns:a14="http://schemas.microsoft.com/office/drawing/2010/main">
+                <a:solidFill>
+                  <a:srgbClr val="FFFFFF"/>
+                </a:solidFill>
+              </a14:hiddenFill>
+            </a:ext>
+          </a:extLst>
+        </p:spPr>
+      </p:pic>
+    </p:spTree>
+    <p:extLst>
+      <p:ext uri="{BB962C8B-B14F-4D97-AF65-F5344CB8AC3E}">
+        <p14:creationId xmlns:p14="http://schemas.microsoft.com/office/powerpoint/2010/main" val="3166579267"/>
+      </p:ext>
+    </p:extLst>
+  </p:cSld>
+  <p:clrMapOvr>
+    <a:masterClrMapping/>
+  </p:clrMapOvr>
+</p:sld>
+</file>
+
+<file path=ppt/slides/slide4.xml><?xml version="1.0" encoding="utf-8"?>
 <p:sld xmlns:a="http://schemas.openxmlformats.org/drawingml/2006/main" xmlns:r="http://schemas.openxmlformats.org/officeDocument/2006/relationships" xmlns:p="http://schemas.openxmlformats.org/presentationml/2006/main">
   <p:cSld>
     <p:spTree>
@@ -7155,7 +7909,7 @@
 </p:sld>
 </file>
 
-<file path=ppt/slides/slide4.xml><?xml version="1.0" encoding="utf-8"?>
+<file path=ppt/slides/slide5.xml><?xml version="1.0" encoding="utf-8"?>
 <p:sld xmlns:a="http://schemas.openxmlformats.org/drawingml/2006/main" xmlns:r="http://schemas.openxmlformats.org/officeDocument/2006/relationships" xmlns:p="http://schemas.openxmlformats.org/presentationml/2006/main">
   <p:cSld>
     <p:spTree>
@@ -8044,7 +8798,7 @@
 </p:sld>
 </file>
 
-<file path=ppt/slides/slide5.xml><?xml version="1.0" encoding="utf-8"?>
+<file path=ppt/slides/slide6.xml><?xml version="1.0" encoding="utf-8"?>
 <p:sld xmlns:a="http://schemas.openxmlformats.org/drawingml/2006/main" xmlns:r="http://schemas.openxmlformats.org/officeDocument/2006/relationships" xmlns:p="http://schemas.openxmlformats.org/presentationml/2006/main">
   <p:cSld>
     <p:spTree>
@@ -9079,7 +9833,7 @@
 </p:sld>
 </file>
 
-<file path=ppt/slides/slide6.xml><?xml version="1.0" encoding="utf-8"?>
+<file path=ppt/slides/slide7.xml><?xml version="1.0" encoding="utf-8"?>
 <p:sld xmlns:a="http://schemas.openxmlformats.org/drawingml/2006/main" xmlns:r="http://schemas.openxmlformats.org/officeDocument/2006/relationships" xmlns:p="http://schemas.openxmlformats.org/presentationml/2006/main">
   <p:cSld>
     <p:spTree>
@@ -9422,7 +10176,7 @@
 </p:sld>
 </file>
 
-<file path=ppt/slides/slide7.xml><?xml version="1.0" encoding="utf-8"?>
+<file path=ppt/slides/slide8.xml><?xml version="1.0" encoding="utf-8"?>
 <p:sld xmlns:a="http://schemas.openxmlformats.org/drawingml/2006/main" xmlns:r="http://schemas.openxmlformats.org/officeDocument/2006/relationships" xmlns:p="http://schemas.openxmlformats.org/presentationml/2006/main">
   <p:cSld>
     <p:spTree>
@@ -9897,7 +10651,7 @@
           <a:prstGeom prst="straightConnector1">
             <a:avLst/>
           </a:prstGeom>
-          <a:ln>
+          <a:ln w="15875">
             <a:solidFill>
               <a:schemeClr val="tx1"/>
             </a:solidFill>
@@ -11227,7 +11981,7 @@
 </p:sld>
 </file>
 
-<file path=ppt/slides/slide8.xml><?xml version="1.0" encoding="utf-8"?>
+<file path=ppt/slides/slide9.xml><?xml version="1.0" encoding="utf-8"?>
 <p:sld xmlns:a="http://schemas.openxmlformats.org/drawingml/2006/main" xmlns:r="http://schemas.openxmlformats.org/officeDocument/2006/relationships" xmlns:p="http://schemas.openxmlformats.org/presentationml/2006/main">
   <p:cSld>
     <p:spTree>
@@ -11547,401 +12301,6 @@
     <p:extLst>
       <p:ext uri="{BB962C8B-B14F-4D97-AF65-F5344CB8AC3E}">
         <p14:creationId xmlns:p14="http://schemas.microsoft.com/office/powerpoint/2010/main" val="2048550274"/>
-      </p:ext>
-    </p:extLst>
-  </p:cSld>
-  <p:clrMapOvr>
-    <a:masterClrMapping/>
-  </p:clrMapOvr>
-</p:sld>
-</file>
-
-<file path=ppt/slides/slide9.xml><?xml version="1.0" encoding="utf-8"?>
-<p:sld xmlns:a="http://schemas.openxmlformats.org/drawingml/2006/main" xmlns:r="http://schemas.openxmlformats.org/officeDocument/2006/relationships" xmlns:p="http://schemas.openxmlformats.org/presentationml/2006/main">
-  <p:cSld>
-    <p:spTree>
-      <p:nvGrpSpPr>
-        <p:cNvPr id="1" name=""/>
-        <p:cNvGrpSpPr/>
-        <p:nvPr/>
-      </p:nvGrpSpPr>
-      <p:grpSpPr>
-        <a:xfrm>
-          <a:off x="0" y="0"/>
-          <a:ext cx="0" cy="0"/>
-          <a:chOff x="0" y="0"/>
-          <a:chExt cx="0" cy="0"/>
-        </a:xfrm>
-      </p:grpSpPr>
-      <p:pic>
-        <p:nvPicPr>
-          <p:cNvPr id="5" name="Picture 4" descr="Diagram&#10;&#10;Description automatically generated">
-            <a:extLst>
-              <a:ext uri="{FF2B5EF4-FFF2-40B4-BE49-F238E27FC236}">
-                <a16:creationId xmlns:a16="http://schemas.microsoft.com/office/drawing/2014/main" id="{AE882A21-E5EE-F8D0-0F83-949070BDE773}"/>
-              </a:ext>
-            </a:extLst>
-          </p:cNvPr>
-          <p:cNvPicPr>
-            <a:picLocks noChangeAspect="1"/>
-          </p:cNvPicPr>
-          <p:nvPr/>
-        </p:nvPicPr>
-        <p:blipFill>
-          <a:blip r:embed="rId2"/>
-          <a:stretch>
-            <a:fillRect/>
-          </a:stretch>
-        </p:blipFill>
-        <p:spPr>
-          <a:xfrm>
-            <a:off x="0" y="186055"/>
-            <a:ext cx="8402638" cy="6671945"/>
-          </a:xfrm>
-          <a:prstGeom prst="rect">
-            <a:avLst/>
-          </a:prstGeom>
-        </p:spPr>
-      </p:pic>
-      <mc:AlternateContent xmlns:mc="http://schemas.openxmlformats.org/markup-compatibility/2006">
-        <mc:Choice xmlns:a14="http://schemas.microsoft.com/office/drawing/2010/main" Requires="a14">
-          <p:sp>
-            <p:nvSpPr>
-              <p:cNvPr id="6" name="TextBox 5">
-                <a:extLst>
-                  <a:ext uri="{FF2B5EF4-FFF2-40B4-BE49-F238E27FC236}">
-                    <a16:creationId xmlns:a16="http://schemas.microsoft.com/office/drawing/2014/main" id="{82176202-26EB-393C-9BE4-BC907CE2748B}"/>
-                  </a:ext>
-                </a:extLst>
-              </p:cNvPr>
-              <p:cNvSpPr txBox="1"/>
-              <p:nvPr/>
-            </p:nvSpPr>
-            <p:spPr>
-              <a:xfrm>
-                <a:off x="7978775" y="2759586"/>
-                <a:ext cx="3914775" cy="669414"/>
-              </a:xfrm>
-              <a:prstGeom prst="rect">
-                <a:avLst/>
-              </a:prstGeom>
-              <a:noFill/>
-            </p:spPr>
-            <p:txBody>
-              <a:bodyPr wrap="square" rtlCol="0">
-                <a:spAutoFit/>
-              </a:bodyPr>
-              <a:lstStyle/>
-              <a:p>
-                <a14:m>
-                  <m:oMathPara xmlns:m="http://schemas.openxmlformats.org/officeDocument/2006/math">
-                    <m:oMathParaPr>
-                      <m:jc m:val="centerGroup"/>
-                    </m:oMathParaPr>
-                    <m:oMath xmlns:m="http://schemas.openxmlformats.org/officeDocument/2006/math">
-                      <m:r>
-                        <a:rPr lang="en-US" sz="3600" i="1" smtClean="0">
-                          <a:latin typeface="Cambria Math" panose="02040503050406030204" pitchFamily="18" charset="0"/>
-                          <a:ea typeface="Cambria Math" panose="02040503050406030204" pitchFamily="18" charset="0"/>
-                        </a:rPr>
-                        <m:t>𝜏</m:t>
-                      </m:r>
-                      <m:d>
-                        <m:dPr>
-                          <m:ctrlPr>
-                            <a:rPr lang="en-US" sz="3600" b="0" i="1" smtClean="0">
-                              <a:latin typeface="Cambria Math" panose="02040503050406030204" pitchFamily="18" charset="0"/>
-                              <a:ea typeface="Cambria Math" panose="02040503050406030204" pitchFamily="18" charset="0"/>
-                            </a:rPr>
-                          </m:ctrlPr>
-                        </m:dPr>
-                        <m:e>
-                          <m:r>
-                            <a:rPr lang="en-US" sz="3600" b="0" i="1" smtClean="0">
-                              <a:latin typeface="Cambria Math" panose="02040503050406030204" pitchFamily="18" charset="0"/>
-                              <a:ea typeface="Cambria Math" panose="02040503050406030204" pitchFamily="18" charset="0"/>
-                            </a:rPr>
-                            <m:t>𝜓</m:t>
-                          </m:r>
-                        </m:e>
-                      </m:d>
-                      <m:r>
-                        <a:rPr lang="en-US" sz="3600" b="0" i="1" smtClean="0">
-                          <a:latin typeface="Cambria Math" panose="02040503050406030204" pitchFamily="18" charset="0"/>
-                          <a:ea typeface="Cambria Math" panose="02040503050406030204" pitchFamily="18" charset="0"/>
-                        </a:rPr>
-                        <m:t>= </m:t>
-                      </m:r>
-                      <m:sSup>
-                        <m:sSupPr>
-                          <m:ctrlPr>
-                            <a:rPr lang="en-US" sz="3600" b="0" i="1" smtClean="0">
-                              <a:latin typeface="Cambria Math" panose="02040503050406030204" pitchFamily="18" charset="0"/>
-                              <a:ea typeface="Cambria Math" panose="02040503050406030204" pitchFamily="18" charset="0"/>
-                            </a:rPr>
-                          </m:ctrlPr>
-                        </m:sSupPr>
-                        <m:e>
-                          <m:r>
-                            <a:rPr lang="en-US" sz="3600" b="0" i="1" smtClean="0">
-                              <a:latin typeface="Cambria Math" panose="02040503050406030204" pitchFamily="18" charset="0"/>
-                              <a:ea typeface="Cambria Math" panose="02040503050406030204" pitchFamily="18" charset="0"/>
-                            </a:rPr>
-                            <m:t>𝑒</m:t>
-                          </m:r>
-                        </m:e>
-                        <m:sup>
-                          <m:r>
-                            <a:rPr lang="en-US" sz="3600" b="0" i="1" smtClean="0">
-                              <a:latin typeface="Cambria Math" panose="02040503050406030204" pitchFamily="18" charset="0"/>
-                              <a:ea typeface="Cambria Math" panose="02040503050406030204" pitchFamily="18" charset="0"/>
-                            </a:rPr>
-                            <m:t>−</m:t>
-                          </m:r>
-                          <m:r>
-                            <a:rPr lang="en-US" sz="3600" b="0" i="1" smtClean="0">
-                              <a:latin typeface="Cambria Math" panose="02040503050406030204" pitchFamily="18" charset="0"/>
-                              <a:ea typeface="Cambria Math" panose="02040503050406030204" pitchFamily="18" charset="0"/>
-                            </a:rPr>
-                            <m:t>𝑘</m:t>
-                          </m:r>
-                          <m:r>
-                            <a:rPr lang="en-US" sz="3600" b="0" i="1" smtClean="0">
-                              <a:latin typeface="Cambria Math" panose="02040503050406030204" pitchFamily="18" charset="0"/>
-                              <a:ea typeface="Cambria Math" panose="02040503050406030204" pitchFamily="18" charset="0"/>
-                            </a:rPr>
-                            <m:t>(</m:t>
-                          </m:r>
-                          <m:r>
-                            <a:rPr lang="en-US" sz="3600" b="0" i="1" smtClean="0">
-                              <a:latin typeface="Cambria Math" panose="02040503050406030204" pitchFamily="18" charset="0"/>
-                              <a:ea typeface="Cambria Math" panose="02040503050406030204" pitchFamily="18" charset="0"/>
-                            </a:rPr>
-                            <m:t>𝜓</m:t>
-                          </m:r>
-                          <m:r>
-                            <a:rPr lang="en-US" sz="3600" b="0" i="1" smtClean="0">
-                              <a:latin typeface="Cambria Math" panose="02040503050406030204" pitchFamily="18" charset="0"/>
-                              <a:ea typeface="Cambria Math" panose="02040503050406030204" pitchFamily="18" charset="0"/>
-                            </a:rPr>
-                            <m:t>)×</m:t>
-                          </m:r>
-                          <m:r>
-                            <a:rPr lang="en-US" sz="3600" b="0" i="1" smtClean="0">
-                              <a:latin typeface="Cambria Math" panose="02040503050406030204" pitchFamily="18" charset="0"/>
-                              <a:ea typeface="Cambria Math" panose="02040503050406030204" pitchFamily="18" charset="0"/>
-                            </a:rPr>
-                            <m:t>𝐿𝐴𝐼</m:t>
-                          </m:r>
-                        </m:sup>
-                      </m:sSup>
-                    </m:oMath>
-                  </m:oMathPara>
-                </a14:m>
-                <a:endParaRPr lang="en-US" sz="3600" dirty="0"/>
-              </a:p>
-            </p:txBody>
-          </p:sp>
-        </mc:Choice>
-        <mc:Fallback>
-          <p:sp>
-            <p:nvSpPr>
-              <p:cNvPr id="6" name="TextBox 5">
-                <a:extLst>
-                  <a:ext uri="{FF2B5EF4-FFF2-40B4-BE49-F238E27FC236}">
-                    <a16:creationId xmlns:a16="http://schemas.microsoft.com/office/drawing/2014/main" id="{82176202-26EB-393C-9BE4-BC907CE2748B}"/>
-                  </a:ext>
-                </a:extLst>
-              </p:cNvPr>
-              <p:cNvSpPr txBox="1">
-                <a:spLocks noRot="1" noChangeAspect="1" noMove="1" noResize="1" noEditPoints="1" noAdjustHandles="1" noChangeArrowheads="1" noChangeShapeType="1" noTextEdit="1"/>
-              </p:cNvSpPr>
-              <p:nvPr/>
-            </p:nvSpPr>
-            <p:spPr>
-              <a:xfrm>
-                <a:off x="7978775" y="2759586"/>
-                <a:ext cx="3914775" cy="669414"/>
-              </a:xfrm>
-              <a:prstGeom prst="rect">
-                <a:avLst/>
-              </a:prstGeom>
-              <a:blipFill>
-                <a:blip r:embed="rId3"/>
-                <a:stretch>
-                  <a:fillRect b="-24074"/>
-                </a:stretch>
-              </a:blipFill>
-            </p:spPr>
-            <p:txBody>
-              <a:bodyPr/>
-              <a:lstStyle/>
-              <a:p>
-                <a:r>
-                  <a:rPr lang="en-US">
-                    <a:noFill/>
-                  </a:rPr>
-                  <a:t> </a:t>
-                </a:r>
-              </a:p>
-            </p:txBody>
-          </p:sp>
-        </mc:Fallback>
-      </mc:AlternateContent>
-      <mc:AlternateContent xmlns:mc="http://schemas.openxmlformats.org/markup-compatibility/2006">
-        <mc:Choice xmlns:a14="http://schemas.microsoft.com/office/drawing/2010/main" Requires="a14">
-          <p:sp>
-            <p:nvSpPr>
-              <p:cNvPr id="7" name="TextBox 6">
-                <a:extLst>
-                  <a:ext uri="{FF2B5EF4-FFF2-40B4-BE49-F238E27FC236}">
-                    <a16:creationId xmlns:a16="http://schemas.microsoft.com/office/drawing/2014/main" id="{E55DB5B5-585C-CFDD-DBBC-5B94657E4DD9}"/>
-                  </a:ext>
-                </a:extLst>
-              </p:cNvPr>
-              <p:cNvSpPr txBox="1"/>
-              <p:nvPr/>
-            </p:nvSpPr>
-            <p:spPr>
-              <a:xfrm>
-                <a:off x="8104188" y="1057275"/>
-                <a:ext cx="3789362" cy="1384995"/>
-              </a:xfrm>
-              <a:prstGeom prst="rect">
-                <a:avLst/>
-              </a:prstGeom>
-              <a:noFill/>
-            </p:spPr>
-            <p:txBody>
-              <a:bodyPr wrap="square" rtlCol="0">
-                <a:spAutoFit/>
-              </a:bodyPr>
-              <a:lstStyle/>
-              <a:p>
-                <a:r>
-                  <a:rPr lang="en-US" sz="2800" dirty="0"/>
-                  <a:t>La </a:t>
-                </a:r>
-                <a:r>
-                  <a:rPr lang="en-US" sz="2800" dirty="0" err="1"/>
-                  <a:t>Transmisibilidad</a:t>
-                </a:r>
-                <a:r>
-                  <a:rPr lang="en-US" sz="2800" dirty="0"/>
-                  <a:t>, </a:t>
-                </a:r>
-                <a:r>
-                  <a:rPr lang="en-US" sz="2800" dirty="0" err="1"/>
-                  <a:t>cuanta</a:t>
-                </a:r>
-                <a:r>
-                  <a:rPr lang="en-US" sz="2800" dirty="0"/>
-                  <a:t> luz </a:t>
-                </a:r>
-                <a:r>
-                  <a:rPr lang="en-US" sz="2800" dirty="0" err="1"/>
-                  <a:t>pasa</a:t>
-                </a:r>
-                <a:r>
-                  <a:rPr lang="en-US" sz="2800" dirty="0"/>
-                  <a:t> </a:t>
-                </a:r>
-                <a:r>
-                  <a:rPr lang="en-US" sz="2800" dirty="0" err="1"/>
-                  <a:t>por</a:t>
-                </a:r>
-                <a:r>
-                  <a:rPr lang="en-US" sz="2800" dirty="0"/>
-                  <a:t> </a:t>
-                </a:r>
-                <a:r>
-                  <a:rPr lang="en-US" sz="2800" dirty="0" err="1"/>
-                  <a:t>nuesrto</a:t>
-                </a:r>
-                <a:r>
-                  <a:rPr lang="en-US" sz="2800" dirty="0"/>
-                  <a:t> </a:t>
-                </a:r>
-                <a:r>
-                  <a:rPr lang="en-US" sz="2800" dirty="0" err="1"/>
-                  <a:t>follaje</a:t>
-                </a:r>
-                <a:r>
-                  <a:rPr lang="en-US" sz="2800" dirty="0"/>
-                  <a:t>, </a:t>
-                </a:r>
-                <a14:m>
-                  <m:oMath xmlns:m="http://schemas.openxmlformats.org/officeDocument/2006/math">
-                    <m:r>
-                      <a:rPr lang="en-US" sz="2800" i="1" smtClean="0">
-                        <a:latin typeface="Cambria Math" panose="02040503050406030204" pitchFamily="18" charset="0"/>
-                        <a:ea typeface="Cambria Math" panose="02040503050406030204" pitchFamily="18" charset="0"/>
-                      </a:rPr>
-                      <m:t>𝜏</m:t>
-                    </m:r>
-                    <m:r>
-                      <a:rPr lang="en-US" sz="2800" b="0" i="1" smtClean="0">
-                        <a:latin typeface="Cambria Math" panose="02040503050406030204" pitchFamily="18" charset="0"/>
-                        <a:ea typeface="Cambria Math" panose="02040503050406030204" pitchFamily="18" charset="0"/>
-                      </a:rPr>
-                      <m:t>:</m:t>
-                    </m:r>
-                  </m:oMath>
-                </a14:m>
-                <a:endParaRPr lang="en-US" sz="2800" dirty="0"/>
-              </a:p>
-            </p:txBody>
-          </p:sp>
-        </mc:Choice>
-        <mc:Fallback>
-          <p:sp>
-            <p:nvSpPr>
-              <p:cNvPr id="7" name="TextBox 6">
-                <a:extLst>
-                  <a:ext uri="{FF2B5EF4-FFF2-40B4-BE49-F238E27FC236}">
-                    <a16:creationId xmlns:a16="http://schemas.microsoft.com/office/drawing/2014/main" id="{E55DB5B5-585C-CFDD-DBBC-5B94657E4DD9}"/>
-                  </a:ext>
-                </a:extLst>
-              </p:cNvPr>
-              <p:cNvSpPr txBox="1">
-                <a:spLocks noRot="1" noChangeAspect="1" noMove="1" noResize="1" noEditPoints="1" noAdjustHandles="1" noChangeArrowheads="1" noChangeShapeType="1" noTextEdit="1"/>
-              </p:cNvSpPr>
-              <p:nvPr/>
-            </p:nvSpPr>
-            <p:spPr>
-              <a:xfrm>
-                <a:off x="8104188" y="1057275"/>
-                <a:ext cx="3789362" cy="1384995"/>
-              </a:xfrm>
-              <a:prstGeom prst="rect">
-                <a:avLst/>
-              </a:prstGeom>
-              <a:blipFill>
-                <a:blip r:embed="rId4"/>
-                <a:stretch>
-                  <a:fillRect l="-3000" t="-4545" b="-10909"/>
-                </a:stretch>
-              </a:blipFill>
-            </p:spPr>
-            <p:txBody>
-              <a:bodyPr/>
-              <a:lstStyle/>
-              <a:p>
-                <a:r>
-                  <a:rPr lang="en-US">
-                    <a:noFill/>
-                  </a:rPr>
-                  <a:t> </a:t>
-                </a:r>
-              </a:p>
-            </p:txBody>
-          </p:sp>
-        </mc:Fallback>
-      </mc:AlternateContent>
-    </p:spTree>
-    <p:extLst>
-      <p:ext uri="{BB962C8B-B14F-4D97-AF65-F5344CB8AC3E}">
-        <p14:creationId xmlns:p14="http://schemas.microsoft.com/office/powerpoint/2010/main" val="3861651659"/>
       </p:ext>
     </p:extLst>
   </p:cSld>

</xml_diff>